<commit_message>
atualização de documentação inicial
</commit_message>
<xml_diff>
--- a/documentos/CasosDeUso_Requisitos.pptx
+++ b/documentos/CasosDeUso_Requisitos.pptx
@@ -16591,14 +16591,14 @@
               <a:buNone/>
             </a:pPr>
             <a:r>
-              <a:rPr lang="pt-BR" sz="2000">
+              <a:rPr lang="pt-BR" sz="2000" dirty="0">
                 <a:solidFill>
                   <a:srgbClr val="08664C"/>
                 </a:solidFill>
               </a:rPr>
               <a:t>IC/UFF</a:t>
             </a:r>
-            <a:endParaRPr/>
+            <a:endParaRPr dirty="0"/>
           </a:p>
           <a:p>
             <a:pPr marL="0" lvl="0" indent="0" algn="ctr" rtl="0">
@@ -16615,14 +16615,14 @@
               <a:buNone/>
             </a:pPr>
             <a:r>
-              <a:rPr lang="pt-BR" sz="1800">
+              <a:rPr lang="pt-BR" sz="1800" dirty="0">
                 <a:solidFill>
                   <a:srgbClr val="08664C"/>
                 </a:solidFill>
               </a:rPr>
               <a:t>Projeto de Software</a:t>
             </a:r>
-            <a:endParaRPr/>
+            <a:endParaRPr dirty="0"/>
           </a:p>
           <a:p>
             <a:pPr marL="0" lvl="0" indent="0" algn="ctr" rtl="0">
@@ -16638,7 +16638,7 @@
               <a:buSzPts val="440"/>
               <a:buNone/>
             </a:pPr>
-            <a:endParaRPr sz="1600">
+            <a:endParaRPr sz="1600" dirty="0">
               <a:solidFill>
                 <a:srgbClr val="08664C"/>
               </a:solidFill>
@@ -16659,14 +16659,14 @@
               <a:buNone/>
             </a:pPr>
             <a:r>
-              <a:rPr lang="pt-BR" sz="1600">
+              <a:rPr lang="pt-BR" sz="1600" dirty="0">
                 <a:solidFill>
                   <a:srgbClr val="08664C"/>
                 </a:solidFill>
               </a:rPr>
               <a:t>Professor: </a:t>
             </a:r>
-            <a:endParaRPr/>
+            <a:endParaRPr dirty="0"/>
           </a:p>
           <a:p>
             <a:pPr marL="0" lvl="0" indent="0" algn="ctr" rtl="0">
@@ -16683,14 +16683,14 @@
               <a:buNone/>
             </a:pPr>
             <a:r>
-              <a:rPr lang="pt-BR" sz="1600">
+              <a:rPr lang="pt-BR" sz="1600" dirty="0">
                 <a:solidFill>
                   <a:srgbClr val="08664C"/>
                 </a:solidFill>
               </a:rPr>
               <a:t>Paulo Figueiredo Pires</a:t>
             </a:r>
-            <a:endParaRPr/>
+            <a:endParaRPr dirty="0"/>
           </a:p>
           <a:p>
             <a:pPr marL="0" lvl="0" indent="0" algn="ctr" rtl="0">
@@ -16706,7 +16706,7 @@
               <a:buSzPts val="440"/>
               <a:buNone/>
             </a:pPr>
-            <a:endParaRPr sz="1400">
+            <a:endParaRPr sz="1400" dirty="0">
               <a:solidFill>
                 <a:srgbClr val="08664C"/>
               </a:solidFill>
@@ -16727,14 +16727,14 @@
               <a:buNone/>
             </a:pPr>
             <a:r>
-              <a:rPr lang="pt-BR" sz="1400" b="1">
+              <a:rPr lang="pt-BR" sz="1400" b="1" dirty="0">
                 <a:solidFill>
                   <a:srgbClr val="08664C"/>
                 </a:solidFill>
               </a:rPr>
               <a:t>Grupo 5:</a:t>
             </a:r>
-            <a:endParaRPr/>
+            <a:endParaRPr dirty="0"/>
           </a:p>
           <a:p>
             <a:pPr marL="0" lvl="0" indent="0" algn="ctr" rtl="0">
@@ -16751,14 +16751,14 @@
               <a:buNone/>
             </a:pPr>
             <a:r>
-              <a:rPr lang="pt-BR" sz="1200">
+              <a:rPr lang="pt-BR" sz="1200" dirty="0">
                 <a:solidFill>
                   <a:srgbClr val="08664C"/>
                 </a:solidFill>
               </a:rPr>
               <a:t>Gabriel Figueiredo Vieira</a:t>
             </a:r>
-            <a:endParaRPr/>
+            <a:endParaRPr dirty="0"/>
           </a:p>
           <a:p>
             <a:pPr marL="0" lvl="0" indent="0" algn="ctr" rtl="0">
@@ -16775,14 +16775,14 @@
               <a:buNone/>
             </a:pPr>
             <a:r>
-              <a:rPr lang="pt-BR" sz="1200">
+              <a:rPr lang="pt-BR" sz="1200" dirty="0">
                 <a:solidFill>
                   <a:srgbClr val="08664C"/>
                 </a:solidFill>
               </a:rPr>
               <a:t>Jair de Lima Ribeiro</a:t>
             </a:r>
-            <a:endParaRPr/>
+            <a:endParaRPr dirty="0"/>
           </a:p>
           <a:p>
             <a:pPr marL="0" lvl="0" indent="0" algn="ctr" rtl="0">
@@ -16799,14 +16799,30 @@
               <a:buNone/>
             </a:pPr>
             <a:r>
-              <a:rPr lang="pt-BR" sz="1200">
+              <a:rPr lang="pt-BR" sz="1200" dirty="0">
                 <a:solidFill>
                   <a:srgbClr val="08664C"/>
                 </a:solidFill>
               </a:rPr>
-              <a:t>Marcio Bedran M. da Costa</a:t>
+              <a:t>Marcio </a:t>
             </a:r>
-            <a:endParaRPr/>
+            <a:r>
+              <a:rPr lang="pt-BR" sz="1200" dirty="0" err="1">
+                <a:solidFill>
+                  <a:srgbClr val="08664C"/>
+                </a:solidFill>
+              </a:rPr>
+              <a:t>Bedran</a:t>
+            </a:r>
+            <a:r>
+              <a:rPr lang="pt-BR" sz="1200" dirty="0">
+                <a:solidFill>
+                  <a:srgbClr val="08664C"/>
+                </a:solidFill>
+              </a:rPr>
+              <a:t> M. da Costa</a:t>
+            </a:r>
+            <a:endParaRPr dirty="0"/>
           </a:p>
           <a:p>
             <a:pPr marL="0" lvl="0" indent="0" algn="ctr" rtl="0">
@@ -16823,14 +16839,14 @@
               <a:buNone/>
             </a:pPr>
             <a:r>
-              <a:rPr lang="pt-BR" sz="1200">
+              <a:rPr lang="pt-BR" sz="1200" dirty="0">
                 <a:solidFill>
                   <a:srgbClr val="08664C"/>
                 </a:solidFill>
               </a:rPr>
               <a:t>Rodrigo dos Santos Carvalho </a:t>
             </a:r>
-            <a:endParaRPr/>
+            <a:endParaRPr dirty="0"/>
           </a:p>
           <a:p>
             <a:pPr marL="0" lvl="0" indent="0" algn="ctr" rtl="0">
@@ -16847,14 +16863,14 @@
               <a:buNone/>
             </a:pPr>
             <a:r>
-              <a:rPr lang="pt-BR" sz="1200">
+              <a:rPr lang="pt-BR" sz="1200" dirty="0">
                 <a:solidFill>
                   <a:srgbClr val="08664C"/>
                 </a:solidFill>
               </a:rPr>
-              <a:t>Thiago Rodrigues da Motta Fagundes</a:t>
+              <a:t>Thiago R. da Motta Fagundes</a:t>
             </a:r>
-            <a:endParaRPr/>
+            <a:endParaRPr dirty="0"/>
           </a:p>
           <a:p>
             <a:pPr marL="0" lvl="0" indent="0" algn="ctr" rtl="0">
@@ -16871,14 +16887,30 @@
               <a:buNone/>
             </a:pPr>
             <a:r>
-              <a:rPr lang="pt-BR" sz="1200">
+              <a:rPr lang="pt-BR" sz="1200" dirty="0">
                 <a:solidFill>
                   <a:srgbClr val="08664C"/>
                 </a:solidFill>
               </a:rPr>
-              <a:t>Victor Verdan Braga</a:t>
+              <a:t>Victor </a:t>
             </a:r>
-            <a:endParaRPr/>
+            <a:r>
+              <a:rPr lang="pt-BR" sz="1200" dirty="0" err="1">
+                <a:solidFill>
+                  <a:srgbClr val="08664C"/>
+                </a:solidFill>
+              </a:rPr>
+              <a:t>Verdan</a:t>
+            </a:r>
+            <a:r>
+              <a:rPr lang="pt-BR" sz="1200" dirty="0">
+                <a:solidFill>
+                  <a:srgbClr val="08664C"/>
+                </a:solidFill>
+              </a:rPr>
+              <a:t> Braga</a:t>
+            </a:r>
+            <a:endParaRPr dirty="0"/>
           </a:p>
           <a:p>
             <a:pPr marL="0" lvl="0" indent="0" algn="ctr" rtl="0">
@@ -16895,14 +16927,14 @@
               <a:buNone/>
             </a:pPr>
             <a:r>
-              <a:rPr lang="pt-BR" sz="1200">
+              <a:rPr lang="pt-BR" sz="1200" dirty="0">
                 <a:solidFill>
                   <a:srgbClr val="08664C"/>
                 </a:solidFill>
               </a:rPr>
               <a:t>Winne P. I. Domingues</a:t>
             </a:r>
-            <a:endParaRPr/>
+            <a:endParaRPr dirty="0"/>
           </a:p>
           <a:p>
             <a:pPr marL="0" lvl="0" indent="0" algn="ctr" rtl="0">
@@ -16918,7 +16950,7 @@
               <a:buSzPts val="440"/>
               <a:buNone/>
             </a:pPr>
-            <a:endParaRPr sz="1600">
+            <a:endParaRPr sz="1600" dirty="0">
               <a:solidFill>
                 <a:srgbClr val="08664C"/>
               </a:solidFill>
@@ -16939,14 +16971,14 @@
               <a:buNone/>
             </a:pPr>
             <a:r>
-              <a:rPr lang="pt-BR" sz="1600">
+              <a:rPr lang="pt-BR" sz="1600" dirty="0">
                 <a:solidFill>
                   <a:srgbClr val="08664C"/>
                 </a:solidFill>
               </a:rPr>
               <a:t>2022.1</a:t>
             </a:r>
-            <a:endParaRPr sz="1600">
+            <a:endParaRPr sz="1600" dirty="0">
               <a:solidFill>
                 <a:srgbClr val="08664C"/>
               </a:solidFill>
@@ -16966,7 +16998,7 @@
               <a:buSzPts val="440"/>
               <a:buNone/>
             </a:pPr>
-            <a:endParaRPr sz="1120"/>
+            <a:endParaRPr sz="1120" dirty="0"/>
           </a:p>
         </p:txBody>
       </p:sp>

</xml_diff>

<commit_message>
Alterado UC1 e UC2
</commit_message>
<xml_diff>
--- a/documentos/CasosDeUso_Requisitos.pptx
+++ b/documentos/CasosDeUso_Requisitos.pptx
@@ -19553,7 +19553,7 @@
             <a:tbl>
               <a:tblPr>
                 <a:noFill/>
-                <a:tableStyleId>{139736E0-29E1-41AA-A3F1-4DFFF237EBB1}</a:tableStyleId>
+                <a:tableStyleId>{2FBA5331-9FB4-4AE7-B17D-9EC093DBF87E}</a:tableStyleId>
               </a:tblPr>
               <a:tblGrid>
                 <a:gridCol w="2049100"/>
@@ -19982,7 +19982,7 @@
             <a:tbl>
               <a:tblPr>
                 <a:noFill/>
-                <a:tableStyleId>{139736E0-29E1-41AA-A3F1-4DFFF237EBB1}</a:tableStyleId>
+                <a:tableStyleId>{2FBA5331-9FB4-4AE7-B17D-9EC093DBF87E}</a:tableStyleId>
               </a:tblPr>
               <a:tblGrid>
                 <a:gridCol w="2053225"/>
@@ -20488,7 +20488,7 @@
             <a:tbl>
               <a:tblPr>
                 <a:noFill/>
-                <a:tableStyleId>{139736E0-29E1-41AA-A3F1-4DFFF237EBB1}</a:tableStyleId>
+                <a:tableStyleId>{2FBA5331-9FB4-4AE7-B17D-9EC093DBF87E}</a:tableStyleId>
               </a:tblPr>
               <a:tblGrid>
                 <a:gridCol w="2053225"/>
@@ -20892,7 +20892,7 @@
             <a:tbl>
               <a:tblPr>
                 <a:noFill/>
-                <a:tableStyleId>{139736E0-29E1-41AA-A3F1-4DFFF237EBB1}</a:tableStyleId>
+                <a:tableStyleId>{2FBA5331-9FB4-4AE7-B17D-9EC093DBF87E}</a:tableStyleId>
               </a:tblPr>
               <a:tblGrid>
                 <a:gridCol w="2055275"/>
@@ -21434,7 +21434,7 @@
             <a:tbl>
               <a:tblPr>
                 <a:noFill/>
-                <a:tableStyleId>{139736E0-29E1-41AA-A3F1-4DFFF237EBB1}</a:tableStyleId>
+                <a:tableStyleId>{2FBA5331-9FB4-4AE7-B17D-9EC093DBF87E}</a:tableStyleId>
               </a:tblPr>
               <a:tblGrid>
                 <a:gridCol w="2055275"/>
@@ -21958,7 +21958,7 @@
             <a:tbl>
               <a:tblPr>
                 <a:noFill/>
-                <a:tableStyleId>{139736E0-29E1-41AA-A3F1-4DFFF237EBB1}</a:tableStyleId>
+                <a:tableStyleId>{2FBA5331-9FB4-4AE7-B17D-9EC093DBF87E}</a:tableStyleId>
               </a:tblPr>
               <a:tblGrid>
                 <a:gridCol w="2051150"/>
@@ -22480,7 +22480,7 @@
             <a:tbl>
               <a:tblPr>
                 <a:noFill/>
-                <a:tableStyleId>{139736E0-29E1-41AA-A3F1-4DFFF237EBB1}</a:tableStyleId>
+                <a:tableStyleId>{2FBA5331-9FB4-4AE7-B17D-9EC093DBF87E}</a:tableStyleId>
               </a:tblPr>
               <a:tblGrid>
                 <a:gridCol w="2055275"/>
@@ -22789,7 +22789,7 @@
             <a:tbl>
               <a:tblPr>
                 <a:noFill/>
-                <a:tableStyleId>{139736E0-29E1-41AA-A3F1-4DFFF237EBB1}</a:tableStyleId>
+                <a:tableStyleId>{2FBA5331-9FB4-4AE7-B17D-9EC093DBF87E}</a:tableStyleId>
               </a:tblPr>
               <a:tblGrid>
                 <a:gridCol w="2051150"/>
@@ -23367,7 +23367,7 @@
             <a:tbl>
               <a:tblPr>
                 <a:noFill/>
-                <a:tableStyleId>{139736E0-29E1-41AA-A3F1-4DFFF237EBB1}</a:tableStyleId>
+                <a:tableStyleId>{2FBA5331-9FB4-4AE7-B17D-9EC093DBF87E}</a:tableStyleId>
               </a:tblPr>
               <a:tblGrid>
                 <a:gridCol w="2053225"/>
@@ -23966,7 +23966,7 @@
             <a:tbl>
               <a:tblPr>
                 <a:noFill/>
-                <a:tableStyleId>{139736E0-29E1-41AA-A3F1-4DFFF237EBB1}</a:tableStyleId>
+                <a:tableStyleId>{2FBA5331-9FB4-4AE7-B17D-9EC093DBF87E}</a:tableStyleId>
               </a:tblPr>
               <a:tblGrid>
                 <a:gridCol w="2055275"/>
@@ -24524,7 +24524,7 @@
             <a:tbl>
               <a:tblPr>
                 <a:noFill/>
-                <a:tableStyleId>{139736E0-29E1-41AA-A3F1-4DFFF237EBB1}</a:tableStyleId>
+                <a:tableStyleId>{2FBA5331-9FB4-4AE7-B17D-9EC093DBF87E}</a:tableStyleId>
               </a:tblPr>
               <a:tblGrid>
                 <a:gridCol w="1180100"/>
@@ -25497,7 +25497,7 @@
             <a:tbl>
               <a:tblPr>
                 <a:noFill/>
-                <a:tableStyleId>{139736E0-29E1-41AA-A3F1-4DFFF237EBB1}</a:tableStyleId>
+                <a:tableStyleId>{2FBA5331-9FB4-4AE7-B17D-9EC093DBF87E}</a:tableStyleId>
               </a:tblPr>
               <a:tblGrid>
                 <a:gridCol w="2049100"/>
@@ -25829,7 +25829,7 @@
             <a:tbl>
               <a:tblPr>
                 <a:noFill/>
-                <a:tableStyleId>{139736E0-29E1-41AA-A3F1-4DFFF237EBB1}</a:tableStyleId>
+                <a:tableStyleId>{2FBA5331-9FB4-4AE7-B17D-9EC093DBF87E}</a:tableStyleId>
               </a:tblPr>
               <a:tblGrid>
                 <a:gridCol w="2051150"/>
@@ -26327,7 +26327,7 @@
             <a:tbl>
               <a:tblPr>
                 <a:noFill/>
-                <a:tableStyleId>{139736E0-29E1-41AA-A3F1-4DFFF237EBB1}</a:tableStyleId>
+                <a:tableStyleId>{2FBA5331-9FB4-4AE7-B17D-9EC093DBF87E}</a:tableStyleId>
               </a:tblPr>
               <a:tblGrid>
                 <a:gridCol w="2055275"/>
@@ -26661,7 +26661,7 @@
             <a:tbl>
               <a:tblPr>
                 <a:noFill/>
-                <a:tableStyleId>{139736E0-29E1-41AA-A3F1-4DFFF237EBB1}</a:tableStyleId>
+                <a:tableStyleId>{2FBA5331-9FB4-4AE7-B17D-9EC093DBF87E}</a:tableStyleId>
               </a:tblPr>
               <a:tblGrid>
                 <a:gridCol w="761900"/>
@@ -27973,7 +27973,7 @@
             <a:tbl>
               <a:tblPr>
                 <a:noFill/>
-                <a:tableStyleId>{139736E0-29E1-41AA-A3F1-4DFFF237EBB1}</a:tableStyleId>
+                <a:tableStyleId>{2FBA5331-9FB4-4AE7-B17D-9EC093DBF87E}</a:tableStyleId>
               </a:tblPr>
               <a:tblGrid>
                 <a:gridCol w="2129750"/>
@@ -28411,7 +28411,7 @@
             <a:tbl>
               <a:tblPr>
                 <a:noFill/>
-                <a:tableStyleId>{139736E0-29E1-41AA-A3F1-4DFFF237EBB1}</a:tableStyleId>
+                <a:tableStyleId>{2FBA5331-9FB4-4AE7-B17D-9EC093DBF87E}</a:tableStyleId>
               </a:tblPr>
               <a:tblGrid>
                 <a:gridCol w="2042950"/>
@@ -28473,7 +28473,15 @@
                       </a:pPr>
                       <a:r>
                         <a:rPr lang="pt-BR" sz="1350" u="none" cap="none" strike="noStrike"/>
-                        <a:t>UC1 - Usuário se autentica no sistema</a:t>
+                        <a:t>UC1 - </a:t>
+                      </a:r>
+                      <a:r>
+                        <a:rPr lang="pt-BR" sz="1350"/>
+                        <a:t>Autenticar-se</a:t>
+                      </a:r>
+                      <a:r>
+                        <a:rPr lang="pt-BR" sz="1350" u="none" cap="none" strike="noStrike"/>
+                        <a:t> no sistema</a:t>
                       </a:r>
                       <a:endParaRPr sz="1350" u="none" cap="none" strike="noStrike"/>
                     </a:p>
@@ -28920,7 +28928,7 @@
             <a:tbl>
               <a:tblPr>
                 <a:noFill/>
-                <a:tableStyleId>{139736E0-29E1-41AA-A3F1-4DFFF237EBB1}</a:tableStyleId>
+                <a:tableStyleId>{2FBA5331-9FB4-4AE7-B17D-9EC093DBF87E}</a:tableStyleId>
               </a:tblPr>
               <a:tblGrid>
                 <a:gridCol w="2045000"/>
@@ -29296,7 +29304,7 @@
             <a:tbl>
               <a:tblPr>
                 <a:noFill/>
-                <a:tableStyleId>{139736E0-29E1-41AA-A3F1-4DFFF237EBB1}</a:tableStyleId>
+                <a:tableStyleId>{2FBA5331-9FB4-4AE7-B17D-9EC093DBF87E}</a:tableStyleId>
               </a:tblPr>
               <a:tblGrid>
                 <a:gridCol w="2049100"/>
@@ -29403,10 +29411,7 @@
                     <a:bodyPr/>
                     <a:lstStyle/>
                     <a:p>
-                      <a:pPr indent="0" lvl="0" marL="0" marR="0" rtl="0" algn="l">
-                        <a:lnSpc>
-                          <a:spcPct val="100000"/>
-                        </a:lnSpc>
+                      <a:pPr indent="0" lvl="0" marL="0" rtl="0" algn="l">
                         <a:spcBef>
                           <a:spcPts val="0"/>
                         </a:spcBef>
@@ -29421,8 +29426,12 @@
                         <a:buNone/>
                       </a:pPr>
                       <a:r>
-                        <a:rPr lang="pt-BR" sz="1350" u="none" cap="none" strike="noStrike"/>
-                        <a:t>Administrador do sistema</a:t>
+                        <a:rPr lang="pt-BR" sz="1350">
+                          <a:solidFill>
+                            <a:schemeClr val="dk1"/>
+                          </a:solidFill>
+                        </a:rPr>
+                        <a:t>Administrador</a:t>
                       </a:r>
                       <a:endParaRPr sz="1350" u="none" cap="none" strike="noStrike"/>
                     </a:p>
@@ -29798,7 +29807,7 @@
             <a:tbl>
               <a:tblPr>
                 <a:noFill/>
-                <a:tableStyleId>{139736E0-29E1-41AA-A3F1-4DFFF237EBB1}</a:tableStyleId>
+                <a:tableStyleId>{2FBA5331-9FB4-4AE7-B17D-9EC093DBF87E}</a:tableStyleId>
               </a:tblPr>
               <a:tblGrid>
                 <a:gridCol w="2040875"/>
@@ -30160,7 +30169,7 @@
             <a:tbl>
               <a:tblPr>
                 <a:noFill/>
-                <a:tableStyleId>{139736E0-29E1-41AA-A3F1-4DFFF237EBB1}</a:tableStyleId>
+                <a:tableStyleId>{2FBA5331-9FB4-4AE7-B17D-9EC093DBF87E}</a:tableStyleId>
               </a:tblPr>
               <a:tblGrid>
                 <a:gridCol w="2049100"/>
@@ -30651,6 +30660,285 @@
 </file>
 
 <file path=ppt/theme/theme1.xml><?xml version="1.0" encoding="utf-8"?>
+<a:theme xmlns:a="http://schemas.openxmlformats.org/drawingml/2006/main" xmlns:r="http://schemas.openxmlformats.org/officeDocument/2006/relationships" name="Madison">
+  <a:themeElements>
+    <a:clrScheme name="Madison">
+      <a:dk1>
+        <a:srgbClr val="000000"/>
+      </a:dk1>
+      <a:lt1>
+        <a:srgbClr val="FFFFFF"/>
+      </a:lt1>
+      <a:dk2>
+        <a:srgbClr val="1F2D29"/>
+      </a:dk2>
+      <a:lt2>
+        <a:srgbClr val="C5FAEB"/>
+      </a:lt2>
+      <a:accent1>
+        <a:srgbClr val="A1D68B"/>
+      </a:accent1>
+      <a:accent2>
+        <a:srgbClr val="5EC795"/>
+      </a:accent2>
+      <a:accent3>
+        <a:srgbClr val="4DADCF"/>
+      </a:accent3>
+      <a:accent4>
+        <a:srgbClr val="CDB756"/>
+      </a:accent4>
+      <a:accent5>
+        <a:srgbClr val="E29C36"/>
+      </a:accent5>
+      <a:accent6>
+        <a:srgbClr val="8EC0C1"/>
+      </a:accent6>
+      <a:hlink>
+        <a:srgbClr val="6D9D9B"/>
+      </a:hlink>
+      <a:folHlink>
+        <a:srgbClr val="6D8583"/>
+      </a:folHlink>
+    </a:clrScheme>
+    <a:fontScheme name="Office">
+      <a:majorFont>
+        <a:latin typeface="Arial"/>
+        <a:ea typeface=""/>
+        <a:cs typeface=""/>
+        <a:font script="Jpan" typeface="ＭＳ Ｐゴシック"/>
+        <a:font script="Hang" typeface="맑은 고딕"/>
+        <a:font script="Hans" typeface="宋体"/>
+        <a:font script="Hant" typeface="新細明體"/>
+        <a:font script="Arab" typeface="Times New Roman"/>
+        <a:font script="Hebr" typeface="Times New Roman"/>
+        <a:font script="Thai" typeface="Angsana New"/>
+        <a:font script="Ethi" typeface="Nyala"/>
+        <a:font script="Beng" typeface="Vrinda"/>
+        <a:font script="Gujr" typeface="Shruti"/>
+        <a:font script="Khmr" typeface="MoolBoran"/>
+        <a:font script="Knda" typeface="Tunga"/>
+        <a:font script="Guru" typeface="Raavi"/>
+        <a:font script="Cans" typeface="Euphemia"/>
+        <a:font script="Cher" typeface="Plantagenet Cherokee"/>
+        <a:font script="Yiii" typeface="Microsoft Yi Baiti"/>
+        <a:font script="Tibt" typeface="Microsoft Himalaya"/>
+        <a:font script="Thaa" typeface="MV Boli"/>
+        <a:font script="Deva" typeface="Mangal"/>
+        <a:font script="Telu" typeface="Gautami"/>
+        <a:font script="Taml" typeface="Latha"/>
+        <a:font script="Syrc" typeface="Estrangelo Edessa"/>
+        <a:font script="Orya" typeface="Kalinga"/>
+        <a:font script="Mlym" typeface="Kartika"/>
+        <a:font script="Laoo" typeface="DokChampa"/>
+        <a:font script="Sinh" typeface="Iskoola Pota"/>
+        <a:font script="Mong" typeface="Mongolian Baiti"/>
+        <a:font script="Viet" typeface="Times New Roman"/>
+        <a:font script="Uigh" typeface="Microsoft Uighur"/>
+        <a:font script="Geor" typeface="Sylfaen"/>
+      </a:majorFont>
+      <a:minorFont>
+        <a:latin typeface="Arial"/>
+        <a:ea typeface=""/>
+        <a:cs typeface=""/>
+        <a:font script="Jpan" typeface="ＭＳ Ｐゴシック"/>
+        <a:font script="Hang" typeface="맑은 고딕"/>
+        <a:font script="Hans" typeface="宋体"/>
+        <a:font script="Hant" typeface="新細明體"/>
+        <a:font script="Arab" typeface="Arial"/>
+        <a:font script="Hebr" typeface="Arial"/>
+        <a:font script="Thai" typeface="Cordia New"/>
+        <a:font script="Ethi" typeface="Nyala"/>
+        <a:font script="Beng" typeface="Vrinda"/>
+        <a:font script="Gujr" typeface="Shruti"/>
+        <a:font script="Khmr" typeface="DaunPenh"/>
+        <a:font script="Knda" typeface="Tunga"/>
+        <a:font script="Guru" typeface="Raavi"/>
+        <a:font script="Cans" typeface="Euphemia"/>
+        <a:font script="Cher" typeface="Plantagenet Cherokee"/>
+        <a:font script="Yiii" typeface="Microsoft Yi Baiti"/>
+        <a:font script="Tibt" typeface="Microsoft Himalaya"/>
+        <a:font script="Thaa" typeface="MV Boli"/>
+        <a:font script="Deva" typeface="Mangal"/>
+        <a:font script="Telu" typeface="Gautami"/>
+        <a:font script="Taml" typeface="Latha"/>
+        <a:font script="Syrc" typeface="Estrangelo Edessa"/>
+        <a:font script="Orya" typeface="Kalinga"/>
+        <a:font script="Mlym" typeface="Kartika"/>
+        <a:font script="Laoo" typeface="DokChampa"/>
+        <a:font script="Sinh" typeface="Iskoola Pota"/>
+        <a:font script="Mong" typeface="Mongolian Baiti"/>
+        <a:font script="Viet" typeface="Arial"/>
+        <a:font script="Uigh" typeface="Microsoft Uighur"/>
+        <a:font script="Geor" typeface="Sylfaen"/>
+      </a:minorFont>
+    </a:fontScheme>
+    <a:fmtScheme name="Office">
+      <a:fillStyleLst>
+        <a:solidFill>
+          <a:schemeClr val="phClr"/>
+        </a:solidFill>
+        <a:gradFill rotWithShape="1">
+          <a:gsLst>
+            <a:gs pos="0">
+              <a:schemeClr val="phClr">
+                <a:tint val="50000"/>
+                <a:satMod val="300000"/>
+              </a:schemeClr>
+            </a:gs>
+            <a:gs pos="35000">
+              <a:schemeClr val="phClr">
+                <a:tint val="37000"/>
+                <a:satMod val="300000"/>
+              </a:schemeClr>
+            </a:gs>
+            <a:gs pos="100000">
+              <a:schemeClr val="phClr">
+                <a:tint val="15000"/>
+                <a:satMod val="350000"/>
+              </a:schemeClr>
+            </a:gs>
+          </a:gsLst>
+          <a:lin ang="16200000" scaled="1"/>
+        </a:gradFill>
+        <a:gradFill rotWithShape="1">
+          <a:gsLst>
+            <a:gs pos="0">
+              <a:schemeClr val="phClr">
+                <a:tint val="100000"/>
+                <a:shade val="100000"/>
+                <a:satMod val="130000"/>
+              </a:schemeClr>
+            </a:gs>
+            <a:gs pos="100000">
+              <a:schemeClr val="phClr">
+                <a:tint val="50000"/>
+                <a:shade val="100000"/>
+                <a:satMod val="350000"/>
+              </a:schemeClr>
+            </a:gs>
+          </a:gsLst>
+          <a:lin ang="16200000" scaled="0"/>
+        </a:gradFill>
+      </a:fillStyleLst>
+      <a:lnStyleLst>
+        <a:ln w="9525" cap="flat" cmpd="sng" algn="ctr">
+          <a:solidFill>
+            <a:schemeClr val="phClr">
+              <a:shade val="95000"/>
+              <a:satMod val="105000"/>
+            </a:schemeClr>
+          </a:solidFill>
+          <a:prstDash val="solid"/>
+        </a:ln>
+        <a:ln w="25400" cap="flat" cmpd="sng" algn="ctr">
+          <a:solidFill>
+            <a:schemeClr val="phClr"/>
+          </a:solidFill>
+          <a:prstDash val="solid"/>
+        </a:ln>
+        <a:ln w="38100" cap="flat" cmpd="sng" algn="ctr">
+          <a:solidFill>
+            <a:schemeClr val="phClr"/>
+          </a:solidFill>
+          <a:prstDash val="solid"/>
+        </a:ln>
+      </a:lnStyleLst>
+      <a:effectStyleLst>
+        <a:effectStyle>
+          <a:effectLst>
+            <a:outerShdw blurRad="40000" dist="20000" dir="5400000" rotWithShape="0">
+              <a:srgbClr val="000000">
+                <a:alpha val="38000"/>
+              </a:srgbClr>
+            </a:outerShdw>
+          </a:effectLst>
+        </a:effectStyle>
+        <a:effectStyle>
+          <a:effectLst>
+            <a:outerShdw blurRad="40000" dist="23000" dir="5400000" rotWithShape="0">
+              <a:srgbClr val="000000">
+                <a:alpha val="35000"/>
+              </a:srgbClr>
+            </a:outerShdw>
+          </a:effectLst>
+        </a:effectStyle>
+        <a:effectStyle>
+          <a:effectLst>
+            <a:outerShdw blurRad="40000" dist="23000" dir="5400000" rotWithShape="0">
+              <a:srgbClr val="000000">
+                <a:alpha val="35000"/>
+              </a:srgbClr>
+            </a:outerShdw>
+          </a:effectLst>
+          <a:scene3d>
+            <a:camera prst="orthographicFront">
+              <a:rot lat="0" lon="0" rev="0"/>
+            </a:camera>
+            <a:lightRig rig="threePt" dir="t">
+              <a:rot lat="0" lon="0" rev="1200000"/>
+            </a:lightRig>
+          </a:scene3d>
+          <a:sp3d>
+            <a:bevelT w="63500" h="25400"/>
+          </a:sp3d>
+        </a:effectStyle>
+      </a:effectStyleLst>
+      <a:bgFillStyleLst>
+        <a:solidFill>
+          <a:schemeClr val="phClr"/>
+        </a:solidFill>
+        <a:gradFill rotWithShape="1">
+          <a:gsLst>
+            <a:gs pos="0">
+              <a:schemeClr val="phClr">
+                <a:tint val="40000"/>
+                <a:satMod val="350000"/>
+              </a:schemeClr>
+            </a:gs>
+            <a:gs pos="40000">
+              <a:schemeClr val="phClr">
+                <a:tint val="45000"/>
+                <a:shade val="99000"/>
+                <a:satMod val="350000"/>
+              </a:schemeClr>
+            </a:gs>
+            <a:gs pos="100000">
+              <a:schemeClr val="phClr">
+                <a:shade val="20000"/>
+                <a:satMod val="255000"/>
+              </a:schemeClr>
+            </a:gs>
+          </a:gsLst>
+          <a:path path="circle">
+            <a:fillToRect l="50000" t="-80000" r="50000" b="180000"/>
+          </a:path>
+        </a:gradFill>
+        <a:gradFill rotWithShape="1">
+          <a:gsLst>
+            <a:gs pos="0">
+              <a:schemeClr val="phClr">
+                <a:tint val="80000"/>
+                <a:satMod val="300000"/>
+              </a:schemeClr>
+            </a:gs>
+            <a:gs pos="100000">
+              <a:schemeClr val="phClr">
+                <a:shade val="30000"/>
+                <a:satMod val="200000"/>
+              </a:schemeClr>
+            </a:gs>
+          </a:gsLst>
+          <a:path path="circle">
+            <a:fillToRect l="50000" t="50000" r="50000" b="50000"/>
+          </a:path>
+        </a:gradFill>
+      </a:bgFillStyleLst>
+    </a:fmtScheme>
+  </a:themeElements>
+</a:theme>
+</file>
+
+<file path=ppt/theme/theme2.xml><?xml version="1.0" encoding="utf-8"?>
 <a:theme xmlns:a="http://schemas.openxmlformats.org/drawingml/2006/main" xmlns:r="http://schemas.openxmlformats.org/officeDocument/2006/relationships">
   <a:themeElements>
     <a:clrScheme name="Default">
@@ -30927,283 +31215,4 @@
     </a:fmtScheme>
   </a:themeElements>
 </a:theme>
-</file>
-
-<file path=ppt/theme/theme2.xml><?xml version="1.0" encoding="utf-8"?>
-<a:theme xmlns:a="http://schemas.openxmlformats.org/drawingml/2006/main" xmlns:r="http://schemas.openxmlformats.org/officeDocument/2006/relationships" name="Madison">
-  <a:themeElements>
-    <a:clrScheme name="Madison">
-      <a:dk1>
-        <a:srgbClr val="000000"/>
-      </a:dk1>
-      <a:lt1>
-        <a:srgbClr val="FFFFFF"/>
-      </a:lt1>
-      <a:dk2>
-        <a:srgbClr val="1F2D29"/>
-      </a:dk2>
-      <a:lt2>
-        <a:srgbClr val="C5FAEB"/>
-      </a:lt2>
-      <a:accent1>
-        <a:srgbClr val="A1D68B"/>
-      </a:accent1>
-      <a:accent2>
-        <a:srgbClr val="5EC795"/>
-      </a:accent2>
-      <a:accent3>
-        <a:srgbClr val="4DADCF"/>
-      </a:accent3>
-      <a:accent4>
-        <a:srgbClr val="CDB756"/>
-      </a:accent4>
-      <a:accent5>
-        <a:srgbClr val="E29C36"/>
-      </a:accent5>
-      <a:accent6>
-        <a:srgbClr val="8EC0C1"/>
-      </a:accent6>
-      <a:hlink>
-        <a:srgbClr val="6D9D9B"/>
-      </a:hlink>
-      <a:folHlink>
-        <a:srgbClr val="6D8583"/>
-      </a:folHlink>
-    </a:clrScheme>
-    <a:fontScheme name="Office">
-      <a:majorFont>
-        <a:latin typeface="Arial"/>
-        <a:ea typeface=""/>
-        <a:cs typeface=""/>
-        <a:font script="Jpan" typeface="ＭＳ Ｐゴシック"/>
-        <a:font script="Hang" typeface="맑은 고딕"/>
-        <a:font script="Hans" typeface="宋体"/>
-        <a:font script="Hant" typeface="新細明體"/>
-        <a:font script="Arab" typeface="Times New Roman"/>
-        <a:font script="Hebr" typeface="Times New Roman"/>
-        <a:font script="Thai" typeface="Angsana New"/>
-        <a:font script="Ethi" typeface="Nyala"/>
-        <a:font script="Beng" typeface="Vrinda"/>
-        <a:font script="Gujr" typeface="Shruti"/>
-        <a:font script="Khmr" typeface="MoolBoran"/>
-        <a:font script="Knda" typeface="Tunga"/>
-        <a:font script="Guru" typeface="Raavi"/>
-        <a:font script="Cans" typeface="Euphemia"/>
-        <a:font script="Cher" typeface="Plantagenet Cherokee"/>
-        <a:font script="Yiii" typeface="Microsoft Yi Baiti"/>
-        <a:font script="Tibt" typeface="Microsoft Himalaya"/>
-        <a:font script="Thaa" typeface="MV Boli"/>
-        <a:font script="Deva" typeface="Mangal"/>
-        <a:font script="Telu" typeface="Gautami"/>
-        <a:font script="Taml" typeface="Latha"/>
-        <a:font script="Syrc" typeface="Estrangelo Edessa"/>
-        <a:font script="Orya" typeface="Kalinga"/>
-        <a:font script="Mlym" typeface="Kartika"/>
-        <a:font script="Laoo" typeface="DokChampa"/>
-        <a:font script="Sinh" typeface="Iskoola Pota"/>
-        <a:font script="Mong" typeface="Mongolian Baiti"/>
-        <a:font script="Viet" typeface="Times New Roman"/>
-        <a:font script="Uigh" typeface="Microsoft Uighur"/>
-        <a:font script="Geor" typeface="Sylfaen"/>
-      </a:majorFont>
-      <a:minorFont>
-        <a:latin typeface="Arial"/>
-        <a:ea typeface=""/>
-        <a:cs typeface=""/>
-        <a:font script="Jpan" typeface="ＭＳ Ｐゴシック"/>
-        <a:font script="Hang" typeface="맑은 고딕"/>
-        <a:font script="Hans" typeface="宋体"/>
-        <a:font script="Hant" typeface="新細明體"/>
-        <a:font script="Arab" typeface="Arial"/>
-        <a:font script="Hebr" typeface="Arial"/>
-        <a:font script="Thai" typeface="Cordia New"/>
-        <a:font script="Ethi" typeface="Nyala"/>
-        <a:font script="Beng" typeface="Vrinda"/>
-        <a:font script="Gujr" typeface="Shruti"/>
-        <a:font script="Khmr" typeface="DaunPenh"/>
-        <a:font script="Knda" typeface="Tunga"/>
-        <a:font script="Guru" typeface="Raavi"/>
-        <a:font script="Cans" typeface="Euphemia"/>
-        <a:font script="Cher" typeface="Plantagenet Cherokee"/>
-        <a:font script="Yiii" typeface="Microsoft Yi Baiti"/>
-        <a:font script="Tibt" typeface="Microsoft Himalaya"/>
-        <a:font script="Thaa" typeface="MV Boli"/>
-        <a:font script="Deva" typeface="Mangal"/>
-        <a:font script="Telu" typeface="Gautami"/>
-        <a:font script="Taml" typeface="Latha"/>
-        <a:font script="Syrc" typeface="Estrangelo Edessa"/>
-        <a:font script="Orya" typeface="Kalinga"/>
-        <a:font script="Mlym" typeface="Kartika"/>
-        <a:font script="Laoo" typeface="DokChampa"/>
-        <a:font script="Sinh" typeface="Iskoola Pota"/>
-        <a:font script="Mong" typeface="Mongolian Baiti"/>
-        <a:font script="Viet" typeface="Arial"/>
-        <a:font script="Uigh" typeface="Microsoft Uighur"/>
-        <a:font script="Geor" typeface="Sylfaen"/>
-      </a:minorFont>
-    </a:fontScheme>
-    <a:fmtScheme name="Office">
-      <a:fillStyleLst>
-        <a:solidFill>
-          <a:schemeClr val="phClr"/>
-        </a:solidFill>
-        <a:gradFill rotWithShape="1">
-          <a:gsLst>
-            <a:gs pos="0">
-              <a:schemeClr val="phClr">
-                <a:tint val="50000"/>
-                <a:satMod val="300000"/>
-              </a:schemeClr>
-            </a:gs>
-            <a:gs pos="35000">
-              <a:schemeClr val="phClr">
-                <a:tint val="37000"/>
-                <a:satMod val="300000"/>
-              </a:schemeClr>
-            </a:gs>
-            <a:gs pos="100000">
-              <a:schemeClr val="phClr">
-                <a:tint val="15000"/>
-                <a:satMod val="350000"/>
-              </a:schemeClr>
-            </a:gs>
-          </a:gsLst>
-          <a:lin ang="16200000" scaled="1"/>
-        </a:gradFill>
-        <a:gradFill rotWithShape="1">
-          <a:gsLst>
-            <a:gs pos="0">
-              <a:schemeClr val="phClr">
-                <a:tint val="100000"/>
-                <a:shade val="100000"/>
-                <a:satMod val="130000"/>
-              </a:schemeClr>
-            </a:gs>
-            <a:gs pos="100000">
-              <a:schemeClr val="phClr">
-                <a:tint val="50000"/>
-                <a:shade val="100000"/>
-                <a:satMod val="350000"/>
-              </a:schemeClr>
-            </a:gs>
-          </a:gsLst>
-          <a:lin ang="16200000" scaled="0"/>
-        </a:gradFill>
-      </a:fillStyleLst>
-      <a:lnStyleLst>
-        <a:ln w="9525" cap="flat" cmpd="sng" algn="ctr">
-          <a:solidFill>
-            <a:schemeClr val="phClr">
-              <a:shade val="95000"/>
-              <a:satMod val="105000"/>
-            </a:schemeClr>
-          </a:solidFill>
-          <a:prstDash val="solid"/>
-        </a:ln>
-        <a:ln w="25400" cap="flat" cmpd="sng" algn="ctr">
-          <a:solidFill>
-            <a:schemeClr val="phClr"/>
-          </a:solidFill>
-          <a:prstDash val="solid"/>
-        </a:ln>
-        <a:ln w="38100" cap="flat" cmpd="sng" algn="ctr">
-          <a:solidFill>
-            <a:schemeClr val="phClr"/>
-          </a:solidFill>
-          <a:prstDash val="solid"/>
-        </a:ln>
-      </a:lnStyleLst>
-      <a:effectStyleLst>
-        <a:effectStyle>
-          <a:effectLst>
-            <a:outerShdw blurRad="40000" dist="20000" dir="5400000" rotWithShape="0">
-              <a:srgbClr val="000000">
-                <a:alpha val="38000"/>
-              </a:srgbClr>
-            </a:outerShdw>
-          </a:effectLst>
-        </a:effectStyle>
-        <a:effectStyle>
-          <a:effectLst>
-            <a:outerShdw blurRad="40000" dist="23000" dir="5400000" rotWithShape="0">
-              <a:srgbClr val="000000">
-                <a:alpha val="35000"/>
-              </a:srgbClr>
-            </a:outerShdw>
-          </a:effectLst>
-        </a:effectStyle>
-        <a:effectStyle>
-          <a:effectLst>
-            <a:outerShdw blurRad="40000" dist="23000" dir="5400000" rotWithShape="0">
-              <a:srgbClr val="000000">
-                <a:alpha val="35000"/>
-              </a:srgbClr>
-            </a:outerShdw>
-          </a:effectLst>
-          <a:scene3d>
-            <a:camera prst="orthographicFront">
-              <a:rot lat="0" lon="0" rev="0"/>
-            </a:camera>
-            <a:lightRig rig="threePt" dir="t">
-              <a:rot lat="0" lon="0" rev="1200000"/>
-            </a:lightRig>
-          </a:scene3d>
-          <a:sp3d>
-            <a:bevelT w="63500" h="25400"/>
-          </a:sp3d>
-        </a:effectStyle>
-      </a:effectStyleLst>
-      <a:bgFillStyleLst>
-        <a:solidFill>
-          <a:schemeClr val="phClr"/>
-        </a:solidFill>
-        <a:gradFill rotWithShape="1">
-          <a:gsLst>
-            <a:gs pos="0">
-              <a:schemeClr val="phClr">
-                <a:tint val="40000"/>
-                <a:satMod val="350000"/>
-              </a:schemeClr>
-            </a:gs>
-            <a:gs pos="40000">
-              <a:schemeClr val="phClr">
-                <a:tint val="45000"/>
-                <a:shade val="99000"/>
-                <a:satMod val="350000"/>
-              </a:schemeClr>
-            </a:gs>
-            <a:gs pos="100000">
-              <a:schemeClr val="phClr">
-                <a:shade val="20000"/>
-                <a:satMod val="255000"/>
-              </a:schemeClr>
-            </a:gs>
-          </a:gsLst>
-          <a:path path="circle">
-            <a:fillToRect l="50000" t="-80000" r="50000" b="180000"/>
-          </a:path>
-        </a:gradFill>
-        <a:gradFill rotWithShape="1">
-          <a:gsLst>
-            <a:gs pos="0">
-              <a:schemeClr val="phClr">
-                <a:tint val="80000"/>
-                <a:satMod val="300000"/>
-              </a:schemeClr>
-            </a:gs>
-            <a:gs pos="100000">
-              <a:schemeClr val="phClr">
-                <a:shade val="30000"/>
-                <a:satMod val="200000"/>
-              </a:schemeClr>
-            </a:gs>
-          </a:gsLst>
-          <a:path path="circle">
-            <a:fillToRect l="50000" t="50000" r="50000" b="50000"/>
-          </a:path>
-        </a:gradFill>
-      </a:bgFillStyleLst>
-    </a:fmtScheme>
-  </a:themeElements>
-</a:theme>
 </file>
</xml_diff>